<commit_message>
[ANV] still comparing fluxes
</commit_message>
<xml_diff>
--- a/quick_figures.pptx
+++ b/quick_figures.pptx
@@ -8,6 +8,7 @@
     <p:sldId id="256" r:id="rId2"/>
     <p:sldId id="257" r:id="rId3"/>
     <p:sldId id="258" r:id="rId4"/>
+    <p:sldId id="259" r:id="rId5"/>
   </p:sldIdLst>
   <p:sldSz cx="12192000" cy="6858000"/>
   <p:notesSz cx="6858000" cy="9144000"/>
@@ -4220,6 +4221,66 @@
 </p:sld>
 </file>
 
+<file path=ppt/slides/slide4.xml><?xml version="1.0" encoding="utf-8"?>
+<p:sld xmlns:a="http://schemas.openxmlformats.org/drawingml/2006/main" xmlns:r="http://schemas.openxmlformats.org/officeDocument/2006/relationships" xmlns:p="http://schemas.openxmlformats.org/presentationml/2006/main">
+  <p:cSld>
+    <p:spTree>
+      <p:nvGrpSpPr>
+        <p:cNvPr id="1" name=""/>
+        <p:cNvGrpSpPr/>
+        <p:nvPr/>
+      </p:nvGrpSpPr>
+      <p:grpSpPr>
+        <a:xfrm>
+          <a:off x="0" y="0"/>
+          <a:ext cx="0" cy="0"/>
+          <a:chOff x="0" y="0"/>
+          <a:chExt cx="0" cy="0"/>
+        </a:xfrm>
+      </p:grpSpPr>
+      <p:pic>
+        <p:nvPicPr>
+          <p:cNvPr id="2" name="Picture 1">
+            <a:extLst>
+              <a:ext uri="{FF2B5EF4-FFF2-40B4-BE49-F238E27FC236}">
+                <a16:creationId xmlns:a16="http://schemas.microsoft.com/office/drawing/2014/main" id="{B265A639-F0EC-5556-459A-0CA2C6223972}"/>
+              </a:ext>
+            </a:extLst>
+          </p:cNvPr>
+          <p:cNvPicPr>
+            <a:picLocks noChangeAspect="1"/>
+          </p:cNvPicPr>
+          <p:nvPr/>
+        </p:nvPicPr>
+        <p:blipFill>
+          <a:blip r:embed="rId2"/>
+          <a:stretch>
+            <a:fillRect/>
+          </a:stretch>
+        </p:blipFill>
+        <p:spPr>
+          <a:xfrm>
+            <a:off x="4356362" y="2052966"/>
+            <a:ext cx="3479275" cy="2752067"/>
+          </a:xfrm>
+          <a:prstGeom prst="rect">
+            <a:avLst/>
+          </a:prstGeom>
+        </p:spPr>
+      </p:pic>
+    </p:spTree>
+    <p:extLst>
+      <p:ext uri="{BB962C8B-B14F-4D97-AF65-F5344CB8AC3E}">
+        <p14:creationId xmlns:p14="http://schemas.microsoft.com/office/powerpoint/2010/main" val="230104087"/>
+      </p:ext>
+    </p:extLst>
+  </p:cSld>
+  <p:clrMapOvr>
+    <a:masterClrMapping/>
+  </p:clrMapOvr>
+</p:sld>
+</file>
+
 <file path=ppt/theme/theme1.xml><?xml version="1.0" encoding="utf-8"?>
 <a:theme xmlns:a="http://schemas.openxmlformats.org/drawingml/2006/main" name="Office Theme">
   <a:themeElements>

</xml_diff>

<commit_message>
[ANV] updated the quick figures pptx
</commit_message>
<xml_diff>
--- a/quick_figures.pptx
+++ b/quick_figures.pptx
@@ -9,6 +9,7 @@
     <p:sldId id="257" r:id="rId3"/>
     <p:sldId id="258" r:id="rId4"/>
     <p:sldId id="259" r:id="rId5"/>
+    <p:sldId id="260" r:id="rId6"/>
   </p:sldIdLst>
   <p:sldSz cx="12192000" cy="6858000"/>
   <p:notesSz cx="6858000" cy="9144000"/>
@@ -107,6 +108,11 @@
       </a:defRPr>
     </a:lvl9pPr>
   </p:defaultTextStyle>
+  <p:extLst>
+    <p:ext uri="{EFAFB233-063F-42B5-8137-9DF3F51BA10A}">
+      <p15:sldGuideLst xmlns:p15="http://schemas.microsoft.com/office/powerpoint/2012/main"/>
+    </p:ext>
+  </p:extLst>
 </p:presentation>
 </file>
 
@@ -257,7 +263,7 @@
           <a:p>
             <a:fld id="{4A91DB90-0D24-B94B-9BC1-3A1B9E2096B6}" type="datetimeFigureOut">
               <a:rPr lang="en-US" smtClean="0"/>
-              <a:t>1/12/26</a:t>
+              <a:t>2/5/26</a:t>
             </a:fld>
             <a:endParaRPr lang="en-US"/>
           </a:p>
@@ -455,7 +461,7 @@
           <a:p>
             <a:fld id="{4A91DB90-0D24-B94B-9BC1-3A1B9E2096B6}" type="datetimeFigureOut">
               <a:rPr lang="en-US" smtClean="0"/>
-              <a:t>1/12/26</a:t>
+              <a:t>2/5/26</a:t>
             </a:fld>
             <a:endParaRPr lang="en-US"/>
           </a:p>
@@ -663,7 +669,7 @@
           <a:p>
             <a:fld id="{4A91DB90-0D24-B94B-9BC1-3A1B9E2096B6}" type="datetimeFigureOut">
               <a:rPr lang="en-US" smtClean="0"/>
-              <a:t>1/12/26</a:t>
+              <a:t>2/5/26</a:t>
             </a:fld>
             <a:endParaRPr lang="en-US"/>
           </a:p>
@@ -861,7 +867,7 @@
           <a:p>
             <a:fld id="{4A91DB90-0D24-B94B-9BC1-3A1B9E2096B6}" type="datetimeFigureOut">
               <a:rPr lang="en-US" smtClean="0"/>
-              <a:t>1/12/26</a:t>
+              <a:t>2/5/26</a:t>
             </a:fld>
             <a:endParaRPr lang="en-US"/>
           </a:p>
@@ -1136,7 +1142,7 @@
           <a:p>
             <a:fld id="{4A91DB90-0D24-B94B-9BC1-3A1B9E2096B6}" type="datetimeFigureOut">
               <a:rPr lang="en-US" smtClean="0"/>
-              <a:t>1/12/26</a:t>
+              <a:t>2/5/26</a:t>
             </a:fld>
             <a:endParaRPr lang="en-US"/>
           </a:p>
@@ -1401,7 +1407,7 @@
           <a:p>
             <a:fld id="{4A91DB90-0D24-B94B-9BC1-3A1B9E2096B6}" type="datetimeFigureOut">
               <a:rPr lang="en-US" smtClean="0"/>
-              <a:t>1/12/26</a:t>
+              <a:t>2/5/26</a:t>
             </a:fld>
             <a:endParaRPr lang="en-US"/>
           </a:p>
@@ -1813,7 +1819,7 @@
           <a:p>
             <a:fld id="{4A91DB90-0D24-B94B-9BC1-3A1B9E2096B6}" type="datetimeFigureOut">
               <a:rPr lang="en-US" smtClean="0"/>
-              <a:t>1/12/26</a:t>
+              <a:t>2/5/26</a:t>
             </a:fld>
             <a:endParaRPr lang="en-US"/>
           </a:p>
@@ -1954,7 +1960,7 @@
           <a:p>
             <a:fld id="{4A91DB90-0D24-B94B-9BC1-3A1B9E2096B6}" type="datetimeFigureOut">
               <a:rPr lang="en-US" smtClean="0"/>
-              <a:t>1/12/26</a:t>
+              <a:t>2/5/26</a:t>
             </a:fld>
             <a:endParaRPr lang="en-US"/>
           </a:p>
@@ -2067,7 +2073,7 @@
           <a:p>
             <a:fld id="{4A91DB90-0D24-B94B-9BC1-3A1B9E2096B6}" type="datetimeFigureOut">
               <a:rPr lang="en-US" smtClean="0"/>
-              <a:t>1/12/26</a:t>
+              <a:t>2/5/26</a:t>
             </a:fld>
             <a:endParaRPr lang="en-US"/>
           </a:p>
@@ -2378,7 +2384,7 @@
           <a:p>
             <a:fld id="{4A91DB90-0D24-B94B-9BC1-3A1B9E2096B6}" type="datetimeFigureOut">
               <a:rPr lang="en-US" smtClean="0"/>
-              <a:t>1/12/26</a:t>
+              <a:t>2/5/26</a:t>
             </a:fld>
             <a:endParaRPr lang="en-US"/>
           </a:p>
@@ -2666,7 +2672,7 @@
           <a:p>
             <a:fld id="{4A91DB90-0D24-B94B-9BC1-3A1B9E2096B6}" type="datetimeFigureOut">
               <a:rPr lang="en-US" smtClean="0"/>
-              <a:t>1/12/26</a:t>
+              <a:t>2/5/26</a:t>
             </a:fld>
             <a:endParaRPr lang="en-US"/>
           </a:p>
@@ -2907,7 +2913,7 @@
           <a:p>
             <a:fld id="{4A91DB90-0D24-B94B-9BC1-3A1B9E2096B6}" type="datetimeFigureOut">
               <a:rPr lang="en-US" smtClean="0"/>
-              <a:t>1/12/26</a:t>
+              <a:t>2/5/26</a:t>
             </a:fld>
             <a:endParaRPr lang="en-US"/>
           </a:p>
@@ -4281,6 +4287,102 @@
 </p:sld>
 </file>
 
+<file path=ppt/slides/slide5.xml><?xml version="1.0" encoding="utf-8"?>
+<p:sld xmlns:a="http://schemas.openxmlformats.org/drawingml/2006/main" xmlns:r="http://schemas.openxmlformats.org/officeDocument/2006/relationships" xmlns:p="http://schemas.openxmlformats.org/presentationml/2006/main">
+  <p:cSld>
+    <p:spTree>
+      <p:nvGrpSpPr>
+        <p:cNvPr id="1" name="">
+          <a:extLst>
+            <a:ext uri="{FF2B5EF4-FFF2-40B4-BE49-F238E27FC236}">
+              <a16:creationId xmlns:a16="http://schemas.microsoft.com/office/drawing/2014/main" id="{392FD015-C283-AF30-3FCD-2D18B47B2C0A}"/>
+            </a:ext>
+          </a:extLst>
+        </p:cNvPr>
+        <p:cNvGrpSpPr/>
+        <p:nvPr/>
+      </p:nvGrpSpPr>
+      <p:grpSpPr>
+        <a:xfrm>
+          <a:off x="0" y="0"/>
+          <a:ext cx="0" cy="0"/>
+          <a:chOff x="0" y="0"/>
+          <a:chExt cx="0" cy="0"/>
+        </a:xfrm>
+      </p:grpSpPr>
+      <p:pic>
+        <p:nvPicPr>
+          <p:cNvPr id="4" name="Picture 3" descr="A graph of a graph&#10;&#10;AI-generated content may be incorrect.">
+            <a:extLst>
+              <a:ext uri="{FF2B5EF4-FFF2-40B4-BE49-F238E27FC236}">
+                <a16:creationId xmlns:a16="http://schemas.microsoft.com/office/drawing/2014/main" id="{2F40EE0E-EA99-3EA1-1166-0A1AA7AB5106}"/>
+              </a:ext>
+            </a:extLst>
+          </p:cNvPr>
+          <p:cNvPicPr>
+            <a:picLocks noChangeAspect="1"/>
+          </p:cNvPicPr>
+          <p:nvPr/>
+        </p:nvPicPr>
+        <p:blipFill>
+          <a:blip r:embed="rId2"/>
+          <a:stretch>
+            <a:fillRect/>
+          </a:stretch>
+        </p:blipFill>
+        <p:spPr>
+          <a:xfrm>
+            <a:off x="1564408" y="1648918"/>
+            <a:ext cx="3523746" cy="3072984"/>
+          </a:xfrm>
+          <a:prstGeom prst="rect">
+            <a:avLst/>
+          </a:prstGeom>
+        </p:spPr>
+      </p:pic>
+      <p:pic>
+        <p:nvPicPr>
+          <p:cNvPr id="6" name="Picture 5" descr="A graph of a graph with a line and numbers&#10;&#10;AI-generated content may be incorrect.">
+            <a:extLst>
+              <a:ext uri="{FF2B5EF4-FFF2-40B4-BE49-F238E27FC236}">
+                <a16:creationId xmlns:a16="http://schemas.microsoft.com/office/drawing/2014/main" id="{676E37EC-160B-33C4-5595-3B7708658C82}"/>
+              </a:ext>
+            </a:extLst>
+          </p:cNvPr>
+          <p:cNvPicPr>
+            <a:picLocks noChangeAspect="1"/>
+          </p:cNvPicPr>
+          <p:nvPr/>
+        </p:nvPicPr>
+        <p:blipFill>
+          <a:blip r:embed="rId3"/>
+          <a:stretch>
+            <a:fillRect/>
+          </a:stretch>
+        </p:blipFill>
+        <p:spPr>
+          <a:xfrm>
+            <a:off x="6794798" y="1648918"/>
+            <a:ext cx="3523746" cy="3083817"/>
+          </a:xfrm>
+          <a:prstGeom prst="rect">
+            <a:avLst/>
+          </a:prstGeom>
+        </p:spPr>
+      </p:pic>
+    </p:spTree>
+    <p:extLst>
+      <p:ext uri="{BB962C8B-B14F-4D97-AF65-F5344CB8AC3E}">
+        <p14:creationId xmlns:p14="http://schemas.microsoft.com/office/powerpoint/2010/main" val="1764022043"/>
+      </p:ext>
+    </p:extLst>
+  </p:cSld>
+  <p:clrMapOvr>
+    <a:masterClrMapping/>
+  </p:clrMapOvr>
+</p:sld>
+</file>
+
 <file path=ppt/theme/theme1.xml><?xml version="1.0" encoding="utf-8"?>
 <a:theme xmlns:a="http://schemas.openxmlformats.org/drawingml/2006/main" name="Office Theme">
   <a:themeElements>

</xml_diff>